<commit_message>
Updates Defence presentation slides
</commit_message>
<xml_diff>
--- a/docs/slides/Defence_presentation_MSAT-UI.pptx
+++ b/docs/slides/Defence_presentation_MSAT-UI.pptx
@@ -29155,12 +29155,8 @@
               <a:buChar char="n"/>
             </a:pPr>
             <a:r>
-              <a:rPr lang="en-GB" dirty="0" err="1"/>
-              <a:t>Seperate</a:t>
-            </a:r>
-            <a:r>
               <a:rPr lang="en-GB" dirty="0"/>
-              <a:t> List</a:t>
+              <a:t>Separate List</a:t>
             </a:r>
           </a:p>
         </p:txBody>

</xml_diff>